<commit_message>
update: get value of index of max rowcount
</commit_message>
<xml_diff>
--- a/createsp.pptx
+++ b/createsp.pptx
@@ -3192,677 +3192,6 @@
           </a:p>
         </p:txBody>
       </p:sp>
-      <p:graphicFrame>
-        <p:nvGraphicFramePr>
-          <p:cNvPr id="4" name="Table 3"/>
-          <p:cNvGraphicFramePr>
-            <a:graphicFrameLocks noGrp="1"/>
-          </p:cNvGraphicFramePr>
-          <p:nvPr/>
-        </p:nvGraphicFramePr>
-        <p:xfrm>
-          <a:off x="274320" y="1371600"/>
-          <a:ext cx="8778240" cy="731520"/>
-        </p:xfrm>
-        <a:graphic>
-          <a:graphicData uri="http://schemas.openxmlformats.org/drawingml/2006/table">
-            <a:tbl>
-              <a:tblPr firstRow="1" bandRow="1">
-                <a:tableStyleId>{5C22544A-7EE6-4342-B048-85BDC9FD1C3A}</a:tableStyleId>
-              </a:tblPr>
-              <a:tblGrid>
-                <a:gridCol w="914400"/>
-                <a:gridCol w="2011680"/>
-                <a:gridCol w="914400"/>
-                <a:gridCol w="2011680"/>
-                <a:gridCol w="914400"/>
-                <a:gridCol w="2011680"/>
-              </a:tblGrid>
-              <a:tr h="104502">
-                <a:tc>
-                  <a:txBody>
-                    <a:bodyPr/>
-                    <a:lstStyle/>
-                    <a:p/>
-                  </a:txBody>
-                  <a:tcPr/>
-                </a:tc>
-                <a:tc>
-                  <a:txBody>
-                    <a:bodyPr/>
-                    <a:lstStyle/>
-                    <a:p>
-                      <a:r>
-                        <a:rPr sz="1000"/>
-                        <a:t>1st Line</a:t>
-                      </a:r>
-                    </a:p>
-                  </a:txBody>
-                  <a:tcPr/>
-                </a:tc>
-                <a:tc>
-                  <a:txBody>
-                    <a:bodyPr/>
-                    <a:lstStyle/>
-                    <a:p/>
-                  </a:txBody>
-                  <a:tcPr/>
-                </a:tc>
-                <a:tc>
-                  <a:txBody>
-                    <a:bodyPr/>
-                    <a:lstStyle/>
-                    <a:p>
-                      <a:r>
-                        <a:rPr sz="1000"/>
-                        <a:t>2nd Line</a:t>
-                      </a:r>
-                    </a:p>
-                  </a:txBody>
-                  <a:tcPr/>
-                </a:tc>
-                <a:tc>
-                  <a:txBody>
-                    <a:bodyPr/>
-                    <a:lstStyle/>
-                    <a:p/>
-                  </a:txBody>
-                  <a:tcPr/>
-                </a:tc>
-                <a:tc>
-                  <a:txBody>
-                    <a:bodyPr/>
-                    <a:lstStyle/>
-                    <a:p>
-                      <a:r>
-                        <a:rPr sz="1000"/>
-                        <a:t>3rd Line</a:t>
-                      </a:r>
-                    </a:p>
-                  </a:txBody>
-                  <a:tcPr/>
-                </a:tc>
-              </a:tr>
-              <a:tr h="104502">
-                <a:tc>
-                  <a:txBody>
-                    <a:bodyPr/>
-                    <a:lstStyle/>
-                    <a:p/>
-                  </a:txBody>
-                  <a:tcPr/>
-                </a:tc>
-                <a:tc>
-                  <a:txBody>
-                    <a:bodyPr/>
-                    <a:lstStyle/>
-                    <a:p>
-                      <a:r>
-                        <a:rPr sz="1000"/>
-                        <a:t>Lim Li Ping (G10, CT)</a:t>
-                      </a:r>
-                    </a:p>
-                    <a:p>
-                      <a:r>
-                        <a:rPr sz="1000"/>
-                        <a:t>Head (Commercial Malaysia), Commercial Malaysia, Commercial, Strategy &amp; Commercial, PCSB, Upstream Business</a:t>
-                      </a:r>
-                    </a:p>
-                    <a:p>
-                      <a:r>
-                        <a:rPr sz="1000"/>
-                        <a:t>Retire: 03/02/2034,   Age: 45</a:t>
-                      </a:r>
-                    </a:p>
-                    <a:p>
-                      <a:r>
-                        <a:rPr sz="1000"/>
-                        <a:t>PPA: 2, 2, 1, 2, SDP</a:t>
-                      </a:r>
-                    </a:p>
-                  </a:txBody>
-                  <a:tcPr/>
-                </a:tc>
-                <a:tc>
-                  <a:txBody>
-                    <a:bodyPr/>
-                    <a:lstStyle/>
-                    <a:p/>
-                  </a:txBody>
-                  <a:tcPr/>
-                </a:tc>
-                <a:tc>
-                  <a:txBody>
-                    <a:bodyPr/>
-                    <a:lstStyle/>
-                    <a:p>
-                      <a:r>
-                        <a:rPr sz="1000"/>
-                        <a:t>Abdul Aziz bin Othman (G11, CT)</a:t>
-                      </a:r>
-                    </a:p>
-                    <a:p>
-                      <a:r>
-                        <a:rPr sz="1000"/>
-                        <a:t>VP, Strategy &amp; New Ventures, Strategy &amp; Corporate Development, International Assets, PCSB, Upstream Business</a:t>
-                      </a:r>
-                    </a:p>
-                    <a:p>
-                      <a:r>
-                        <a:rPr sz="1000"/>
-                        <a:t>Retire: 06/08/2020,   Age: 54</a:t>
-                      </a:r>
-                    </a:p>
-                    <a:p>
-                      <a:r>
-                        <a:rPr sz="1000"/>
-                        <a:t>PPA: 2, 1, 2, 1, 2</a:t>
-                      </a:r>
-                    </a:p>
-                  </a:txBody>
-                  <a:tcPr/>
-                </a:tc>
-                <a:tc>
-                  <a:txBody>
-                    <a:bodyPr/>
-                    <a:lstStyle/>
-                    <a:p/>
-                  </a:txBody>
-                  <a:tcPr/>
-                </a:tc>
-                <a:tc>
-                  <a:txBody>
-                    <a:bodyPr/>
-                    <a:lstStyle/>
-                    <a:p>
-                      <a:r>
-                        <a:rPr sz="1000"/>
-                        <a:t>Abang Jimmy bin Abang Mordian (G10, CT)</a:t>
-                      </a:r>
-                    </a:p>
-                    <a:p>
-                      <a:r>
-                        <a:rPr sz="1000"/>
-                        <a:t>Head (Leadership &amp; Capability Dev.), Leadership &amp; Capability Development, Human Capital Development, Group Human Resource Management, PETRONAS </a:t>
-                      </a:r>
-                    </a:p>
-                    <a:p>
-                      <a:r>
-                        <a:rPr sz="1000"/>
-                        <a:t>Retire: 23/05/2036,   Age: 43</a:t>
-                      </a:r>
-                    </a:p>
-                    <a:p>
-                      <a:r>
-                        <a:rPr sz="1000"/>
-                        <a:t>PPA: 2, 3S, 2, SDP, 3H</a:t>
-                      </a:r>
-                    </a:p>
-                  </a:txBody>
-                  <a:tcPr/>
-                </a:tc>
-              </a:tr>
-              <a:tr h="104502">
-                <a:tc>
-                  <a:txBody>
-                    <a:bodyPr/>
-                    <a:lstStyle/>
-                    <a:p/>
-                  </a:txBody>
-                  <a:tcPr/>
-                </a:tc>
-                <a:tc>
-                  <a:txBody>
-                    <a:bodyPr/>
-                    <a:lstStyle/>
-                    <a:p>
-                      <a:r>
-                        <a:rPr sz="1000"/>
-                        <a:t>Izwan bin Ismail (G11, CT)</a:t>
-                      </a:r>
-                    </a:p>
-                    <a:p>
-                      <a:r>
-                        <a:rPr sz="1000"/>
-                        <a:t>Head (Executive Assistant), Executive Assistant, President Special Assistant Unit, PETRONAS </a:t>
-                      </a:r>
-                    </a:p>
-                    <a:p>
-                      <a:r>
-                        <a:rPr sz="1000"/>
-                        <a:t>Retire: 25/08/2035,   Age: 44</a:t>
-                      </a:r>
-                    </a:p>
-                    <a:p>
-                      <a:r>
-                        <a:rPr sz="1000"/>
-                        <a:t>PPA: 1, 2, 2, 2, 2</a:t>
-                      </a:r>
-                    </a:p>
-                  </a:txBody>
-                  <a:tcPr/>
-                </a:tc>
-                <a:tc>
-                  <a:txBody>
-                    <a:bodyPr/>
-                    <a:lstStyle/>
-                    <a:p/>
-                  </a:txBody>
-                  <a:tcPr/>
-                </a:tc>
-                <a:tc>
-                  <a:txBody>
-                    <a:bodyPr/>
-                    <a:lstStyle/>
-                    <a:p>
-                      <a:r>
-                        <a:rPr sz="1000"/>
-                        <a:t>Hezlinn Fariss Idris (G11, CT)</a:t>
-                      </a:r>
-                    </a:p>
-                    <a:p>
-                      <a:r>
-                        <a:rPr sz="1000"/>
-                        <a:t>Chief Group Strat. &amp; Transf. Officer, PETRONAS Lubricant International SB, Marketing, Downstream Corporate Office, PETRONAS </a:t>
-                      </a:r>
-                    </a:p>
-                    <a:p>
-                      <a:r>
-                        <a:rPr sz="1000"/>
-                        <a:t>Retire: 19/02/2033,   Age: 46</a:t>
-                      </a:r>
-                    </a:p>
-                    <a:p>
-                      <a:r>
-                        <a:rPr sz="1000"/>
-                        <a:t>PPA: 2, 2, 1, 3H, 2</a:t>
-                      </a:r>
-                    </a:p>
-                  </a:txBody>
-                  <a:tcPr/>
-                </a:tc>
-                <a:tc>
-                  <a:txBody>
-                    <a:bodyPr/>
-                    <a:lstStyle/>
-                    <a:p/>
-                  </a:txBody>
-                  <a:tcPr/>
-                </a:tc>
-                <a:tc>
-                  <a:txBody>
-                    <a:bodyPr/>
-                    <a:lstStyle/>
-                    <a:p>
-                      <a:r>
-                        <a:rPr sz="1000"/>
-                        <a:t>Abdullah Ayman bin Awaluddin (G08, CT)</a:t>
-                      </a:r>
-                    </a:p>
-                    <a:p>
-                      <a:r>
-                        <a:rPr sz="1000"/>
-                        <a:t>Head (Venture Architect), Venture Architect, Venture Builder, Marketing, PDB, Downstream Business</a:t>
-                      </a:r>
-                    </a:p>
-                    <a:p>
-                      <a:r>
-                        <a:rPr sz="1000"/>
-                        <a:t>Retire: 30/07/2041,   Age: 38</a:t>
-                      </a:r>
-                    </a:p>
-                    <a:p>
-                      <a:r>
-                        <a:rPr sz="1000"/>
-                        <a:t>PPA: 3H, 2, 1, 1, 3H</a:t>
-                      </a:r>
-                    </a:p>
-                  </a:txBody>
-                  <a:tcPr/>
-                </a:tc>
-              </a:tr>
-              <a:tr h="104502">
-                <a:tc>
-                  <a:txBody>
-                    <a:bodyPr/>
-                    <a:lstStyle/>
-                    <a:p/>
-                  </a:txBody>
-                  <a:tcPr/>
-                </a:tc>
-                <a:tc>
-                  <a:txBody>
-                    <a:bodyPr/>
-                    <a:lstStyle/>
-                    <a:p>
-                      <a:r>
-                        <a:rPr sz="1000"/>
-                        <a:t>Jazlinawati binti Osman (G11, CT)</a:t>
-                      </a:r>
-                    </a:p>
-                    <a:p>
-                      <a:r>
-                        <a:rPr sz="1000"/>
-                        <a:t>Head (Transformation Office), Transformation Office, President Special Assistant Unit, PETRONAS </a:t>
-                      </a:r>
-                    </a:p>
-                    <a:p>
-                      <a:r>
-                        <a:rPr sz="1000"/>
-                        <a:t>Retire: 23/02/2034,   Age: 45</a:t>
-                      </a:r>
-                    </a:p>
-                    <a:p>
-                      <a:r>
-                        <a:rPr sz="1000"/>
-                        <a:t>PPA: 1, 2, 2, 2, 3H</a:t>
-                      </a:r>
-                    </a:p>
-                  </a:txBody>
-                  <a:tcPr/>
-                </a:tc>
-                <a:tc>
-                  <a:txBody>
-                    <a:bodyPr/>
-                    <a:lstStyle/>
-                    <a:p/>
-                  </a:txBody>
-                  <a:tcPr/>
-                </a:tc>
-                <a:tc>
-                  <a:txBody>
-                    <a:bodyPr/>
-                    <a:lstStyle/>
-                    <a:p>
-                      <a:r>
-                        <a:rPr sz="1000"/>
-                        <a:t>Adiana Mastura binti Mohamed Idris (G09, CT)</a:t>
-                      </a:r>
-                    </a:p>
-                    <a:p>
-                      <a:r>
-                        <a:rPr sz="1000"/>
-                        <a:t>Head (Commercial MPM), Commercial MPM, Commercial, Strategy &amp; Commercial, PETRONAS Upstream</a:t>
-                      </a:r>
-                    </a:p>
-                    <a:p>
-                      <a:r>
-                        <a:rPr sz="1000"/>
-                        <a:t>Retire: 30/08/2036,   Age: 43</a:t>
-                      </a:r>
-                    </a:p>
-                    <a:p>
-                      <a:r>
-                        <a:rPr sz="1000"/>
-                        <a:t>PPA: 2, 3H, 2, 2, 3H</a:t>
-                      </a:r>
-                    </a:p>
-                  </a:txBody>
-                  <a:tcPr/>
-                </a:tc>
-                <a:tc>
-                  <a:txBody>
-                    <a:bodyPr/>
-                    <a:lstStyle/>
-                    <a:p/>
-                  </a:txBody>
-                  <a:tcPr/>
-                </a:tc>
-                <a:tc>
-                  <a:txBody>
-                    <a:bodyPr/>
-                    <a:lstStyle/>
-                    <a:p>
-                      <a:r>
-                        <a:rPr sz="1000"/>
-                        <a:t>Izmir bin Kamarudin (G09, CT)</a:t>
-                      </a:r>
-                    </a:p>
-                    <a:p>
-                      <a:r>
-                        <a:rPr sz="1000"/>
-                        <a:t>Head (BD - USA), Business Development, Strategy &amp; Commercial, PCSB, Upstream Business</a:t>
-                      </a:r>
-                    </a:p>
-                    <a:p>
-                      <a:r>
-                        <a:rPr sz="1000"/>
-                        <a:t>Retire: 29/10/2029,   Age: 45</a:t>
-                      </a:r>
-                    </a:p>
-                    <a:p>
-                      <a:r>
-                        <a:rPr sz="1000"/>
-                        <a:t>PPA: 3H, 2, 3H, 2, 3L</a:t>
-                      </a:r>
-                    </a:p>
-                  </a:txBody>
-                  <a:tcPr/>
-                </a:tc>
-              </a:tr>
-              <a:tr h="104502">
-                <a:tc>
-                  <a:txBody>
-                    <a:bodyPr/>
-                    <a:lstStyle/>
-                    <a:p/>
-                  </a:txBody>
-                  <a:tcPr/>
-                </a:tc>
-                <a:tc>
-                  <a:txBody>
-                    <a:bodyPr/>
-                    <a:lstStyle/>
-                    <a:p/>
-                  </a:txBody>
-                  <a:tcPr/>
-                </a:tc>
-                <a:tc>
-                  <a:txBody>
-                    <a:bodyPr/>
-                    <a:lstStyle/>
-                    <a:p/>
-                  </a:txBody>
-                  <a:tcPr/>
-                </a:tc>
-                <a:tc>
-                  <a:txBody>
-                    <a:bodyPr/>
-                    <a:lstStyle/>
-                    <a:p/>
-                  </a:txBody>
-                  <a:tcPr/>
-                </a:tc>
-                <a:tc>
-                  <a:txBody>
-                    <a:bodyPr/>
-                    <a:lstStyle/>
-                    <a:p/>
-                  </a:txBody>
-                  <a:tcPr/>
-                </a:tc>
-                <a:tc>
-                  <a:txBody>
-                    <a:bodyPr/>
-                    <a:lstStyle/>
-                    <a:p>
-                      <a:r>
-                        <a:rPr sz="1000"/>
-                        <a:t>Muhammad Huzaini bin Ghazali (G09, CT)</a:t>
-                      </a:r>
-                    </a:p>
-                    <a:p>
-                      <a:r>
-                        <a:rPr sz="1000"/>
-                        <a:t>Director (Strategy &amp; Commercial), Strategy &amp; Corporate Development, International Assets, PCSB, Upstream Business</a:t>
-                      </a:r>
-                    </a:p>
-                    <a:p>
-                      <a:r>
-                        <a:rPr sz="1000"/>
-                        <a:t>Retire: 27/06/2031,   Age: 43</a:t>
-                      </a:r>
-                    </a:p>
-                    <a:p>
-                      <a:r>
-                        <a:rPr sz="1000"/>
-                        <a:t>PPA: 3H, 2, 2, 1, 2</a:t>
-                      </a:r>
-                    </a:p>
-                  </a:txBody>
-                  <a:tcPr/>
-                </a:tc>
-              </a:tr>
-              <a:tr h="104502">
-                <a:tc>
-                  <a:txBody>
-                    <a:bodyPr/>
-                    <a:lstStyle/>
-                    <a:p/>
-                  </a:txBody>
-                  <a:tcPr/>
-                </a:tc>
-                <a:tc>
-                  <a:txBody>
-                    <a:bodyPr/>
-                    <a:lstStyle/>
-                    <a:p/>
-                  </a:txBody>
-                  <a:tcPr/>
-                </a:tc>
-                <a:tc>
-                  <a:txBody>
-                    <a:bodyPr/>
-                    <a:lstStyle/>
-                    <a:p/>
-                  </a:txBody>
-                  <a:tcPr/>
-                </a:tc>
-                <a:tc>
-                  <a:txBody>
-                    <a:bodyPr/>
-                    <a:lstStyle/>
-                    <a:p/>
-                  </a:txBody>
-                  <a:tcPr/>
-                </a:tc>
-                <a:tc>
-                  <a:txBody>
-                    <a:bodyPr/>
-                    <a:lstStyle/>
-                    <a:p/>
-                  </a:txBody>
-                  <a:tcPr/>
-                </a:tc>
-                <a:tc>
-                  <a:txBody>
-                    <a:bodyPr/>
-                    <a:lstStyle/>
-                    <a:p>
-                      <a:r>
-                        <a:rPr sz="1000"/>
-                        <a:t>Norzaileen binti Shamsul Kamar (G07, CT)</a:t>
-                      </a:r>
-                    </a:p>
-                    <a:p>
-                      <a:r>
-                        <a:rPr sz="1000"/>
-                        <a:t>Manager (LMT Planning &amp; Performance), LMT Planning &amp; Performance, Finance &amp; Risk, LNG Marketing &amp; Trading, PLSB, Gas &amp; New Energy</a:t>
-                      </a:r>
-                    </a:p>
-                    <a:p>
-                      <a:r>
-                        <a:rPr sz="1000"/>
-                        <a:t>Retire: 29/10/2041,   Age: 38</a:t>
-                      </a:r>
-                    </a:p>
-                    <a:p>
-                      <a:r>
-                        <a:rPr sz="1000"/>
-                        <a:t>PPA: 3H, 2, 2, 2, 2</a:t>
-                      </a:r>
-                    </a:p>
-                  </a:txBody>
-                  <a:tcPr/>
-                </a:tc>
-              </a:tr>
-              <a:tr h="104508">
-                <a:tc>
-                  <a:txBody>
-                    <a:bodyPr/>
-                    <a:lstStyle/>
-                    <a:p/>
-                  </a:txBody>
-                  <a:tcPr/>
-                </a:tc>
-                <a:tc>
-                  <a:txBody>
-                    <a:bodyPr/>
-                    <a:lstStyle/>
-                    <a:p/>
-                  </a:txBody>
-                  <a:tcPr/>
-                </a:tc>
-                <a:tc>
-                  <a:txBody>
-                    <a:bodyPr/>
-                    <a:lstStyle/>
-                    <a:p/>
-                  </a:txBody>
-                  <a:tcPr/>
-                </a:tc>
-                <a:tc>
-                  <a:txBody>
-                    <a:bodyPr/>
-                    <a:lstStyle/>
-                    <a:p/>
-                  </a:txBody>
-                  <a:tcPr/>
-                </a:tc>
-                <a:tc>
-                  <a:txBody>
-                    <a:bodyPr/>
-                    <a:lstStyle/>
-                    <a:p/>
-                  </a:txBody>
-                  <a:tcPr/>
-                </a:tc>
-                <a:tc>
-                  <a:txBody>
-                    <a:bodyPr/>
-                    <a:lstStyle/>
-                    <a:p>
-                      <a:r>
-                        <a:rPr sz="1000"/>
-                        <a:t>Muhammad Farid bin Hussin (G07, CT)</a:t>
-                      </a:r>
-                    </a:p>
-                    <a:p>
-                      <a:r>
-                        <a:rPr sz="1000"/>
-                        <a:t>Manager (Commercial &amp; Pricing), Commercial &amp; Pricing, Energy &amp; Gas Trading, Gas &amp; Power, PEGT, Gas &amp; New Energy</a:t>
-                      </a:r>
-                    </a:p>
-                    <a:p>
-                      <a:r>
-                        <a:rPr sz="1000"/>
-                        <a:t>Retire: 07/06/2043,   Age: 36</a:t>
-                      </a:r>
-                    </a:p>
-                    <a:p>
-                      <a:r>
-                        <a:rPr sz="1000"/>
-                        <a:t>PPA: 3H, 2, 3S, 3S, 2</a:t>
-                      </a:r>
-                    </a:p>
-                  </a:txBody>
-                  <a:tcPr/>
-                </a:tc>
-              </a:tr>
-            </a:tbl>
-          </a:graphicData>
-        </a:graphic>
-      </p:graphicFrame>
     </p:spTree>
   </p:cSld>
   <p:clrMapOvr>
@@ -3925,435 +3254,6 @@
           </a:p>
         </p:txBody>
       </p:sp>
-      <p:graphicFrame>
-        <p:nvGraphicFramePr>
-          <p:cNvPr id="4" name="Table 3"/>
-          <p:cNvGraphicFramePr>
-            <a:graphicFrameLocks noGrp="1"/>
-          </p:cNvGraphicFramePr>
-          <p:nvPr/>
-        </p:nvGraphicFramePr>
-        <p:xfrm>
-          <a:off x="274320" y="1371600"/>
-          <a:ext cx="8778240" cy="731520"/>
-        </p:xfrm>
-        <a:graphic>
-          <a:graphicData uri="http://schemas.openxmlformats.org/drawingml/2006/table">
-            <a:tbl>
-              <a:tblPr firstRow="1" bandRow="1">
-                <a:tableStyleId>{5C22544A-7EE6-4342-B048-85BDC9FD1C3A}</a:tableStyleId>
-              </a:tblPr>
-              <a:tblGrid>
-                <a:gridCol w="914400"/>
-                <a:gridCol w="2011680"/>
-                <a:gridCol w="914400"/>
-                <a:gridCol w="2011680"/>
-                <a:gridCol w="914400"/>
-                <a:gridCol w="2011680"/>
-              </a:tblGrid>
-              <a:tr h="182880">
-                <a:tc>
-                  <a:txBody>
-                    <a:bodyPr/>
-                    <a:lstStyle/>
-                    <a:p/>
-                  </a:txBody>
-                  <a:tcPr/>
-                </a:tc>
-                <a:tc>
-                  <a:txBody>
-                    <a:bodyPr/>
-                    <a:lstStyle/>
-                    <a:p>
-                      <a:r>
-                        <a:rPr sz="1000"/>
-                        <a:t>1st Line</a:t>
-                      </a:r>
-                    </a:p>
-                  </a:txBody>
-                  <a:tcPr/>
-                </a:tc>
-                <a:tc>
-                  <a:txBody>
-                    <a:bodyPr/>
-                    <a:lstStyle/>
-                    <a:p/>
-                  </a:txBody>
-                  <a:tcPr/>
-                </a:tc>
-                <a:tc>
-                  <a:txBody>
-                    <a:bodyPr/>
-                    <a:lstStyle/>
-                    <a:p>
-                      <a:r>
-                        <a:rPr sz="1000"/>
-                        <a:t>2nd Line</a:t>
-                      </a:r>
-                    </a:p>
-                  </a:txBody>
-                  <a:tcPr/>
-                </a:tc>
-                <a:tc>
-                  <a:txBody>
-                    <a:bodyPr/>
-                    <a:lstStyle/>
-                    <a:p/>
-                  </a:txBody>
-                  <a:tcPr/>
-                </a:tc>
-                <a:tc>
-                  <a:txBody>
-                    <a:bodyPr/>
-                    <a:lstStyle/>
-                    <a:p>
-                      <a:r>
-                        <a:rPr sz="1000"/>
-                        <a:t>3rd Line</a:t>
-                      </a:r>
-                    </a:p>
-                  </a:txBody>
-                  <a:tcPr/>
-                </a:tc>
-              </a:tr>
-              <a:tr h="182880">
-                <a:tc>
-                  <a:txBody>
-                    <a:bodyPr/>
-                    <a:lstStyle/>
-                    <a:p/>
-                  </a:txBody>
-                  <a:tcPr/>
-                </a:tc>
-                <a:tc>
-                  <a:txBody>
-                    <a:bodyPr/>
-                    <a:lstStyle/>
-                    <a:p>
-                      <a:r>
-                        <a:rPr sz="1000"/>
-                        <a:t>Izwan bin Ismail (G11, CT)</a:t>
-                      </a:r>
-                    </a:p>
-                    <a:p>
-                      <a:r>
-                        <a:rPr sz="1000"/>
-                        <a:t>Head (Executive Assistant), Executive Assistant, President Special Assistant Unit, PETRONAS </a:t>
-                      </a:r>
-                    </a:p>
-                    <a:p>
-                      <a:r>
-                        <a:rPr sz="1000"/>
-                        <a:t>Retire: 25/08/2035,   Age: 44</a:t>
-                      </a:r>
-                    </a:p>
-                    <a:p>
-                      <a:r>
-                        <a:rPr sz="1000"/>
-                        <a:t>PPA: 1, 2, 2, 2, 2</a:t>
-                      </a:r>
-                    </a:p>
-                  </a:txBody>
-                  <a:tcPr/>
-                </a:tc>
-                <a:tc>
-                  <a:txBody>
-                    <a:bodyPr/>
-                    <a:lstStyle/>
-                    <a:p/>
-                  </a:txBody>
-                  <a:tcPr/>
-                </a:tc>
-                <a:tc>
-                  <a:txBody>
-                    <a:bodyPr/>
-                    <a:lstStyle/>
-                    <a:p>
-                      <a:r>
-                        <a:rPr sz="1000"/>
-                        <a:t>Sani Zuhairi bin Zainudin (G10, CT)</a:t>
-                      </a:r>
-                    </a:p>
-                    <a:p>
-                      <a:r>
-                        <a:rPr sz="1000"/>
-                        <a:t>Head (Business Development &amp; Commercial), Business Development &amp; Commercial, Strategy &amp; Business Development, PETRONAS Gas &amp; New Energy</a:t>
-                      </a:r>
-                    </a:p>
-                    <a:p>
-                      <a:r>
-                        <a:rPr sz="1000"/>
-                        <a:t>Retire: 10/10/2031,   Age: 43</a:t>
-                      </a:r>
-                    </a:p>
-                    <a:p>
-                      <a:r>
-                        <a:rPr sz="1000"/>
-                        <a:t>PPA: 2, 2, 2, 2, 2</a:t>
-                      </a:r>
-                    </a:p>
-                  </a:txBody>
-                  <a:tcPr/>
-                </a:tc>
-                <a:tc>
-                  <a:txBody>
-                    <a:bodyPr/>
-                    <a:lstStyle/>
-                    <a:p/>
-                  </a:txBody>
-                  <a:tcPr/>
-                </a:tc>
-                <a:tc>
-                  <a:txBody>
-                    <a:bodyPr/>
-                    <a:lstStyle/>
-                    <a:p>
-                      <a:r>
-                        <a:rPr sz="1000"/>
-                        <a:t>Mohd Faizal bin Mohamed Sulaiman (G08, CT)</a:t>
-                      </a:r>
-                    </a:p>
-                    <a:p>
-                      <a:r>
-                        <a:rPr sz="1000"/>
-                        <a:t>Head (Marketing – South East Asia), Marketing - South East Asia, Marketing &amp; Trading, LNG Marketing &amp; Trading, PLL, Gas &amp; New Energy</a:t>
-                      </a:r>
-                    </a:p>
-                    <a:p>
-                      <a:r>
-                        <a:rPr sz="1000"/>
-                        <a:t>Retire: 26/04/2042,   Age: 37</a:t>
-                      </a:r>
-                    </a:p>
-                    <a:p>
-                      <a:r>
-                        <a:rPr sz="1000"/>
-                        <a:t>PPA: 3H, 1, 2, 2, 1</a:t>
-                      </a:r>
-                    </a:p>
-                  </a:txBody>
-                  <a:tcPr/>
-                </a:tc>
-              </a:tr>
-              <a:tr h="182880">
-                <a:tc>
-                  <a:txBody>
-                    <a:bodyPr/>
-                    <a:lstStyle/>
-                    <a:p/>
-                  </a:txBody>
-                  <a:tcPr/>
-                </a:tc>
-                <a:tc>
-                  <a:txBody>
-                    <a:bodyPr/>
-                    <a:lstStyle/>
-                    <a:p>
-                      <a:r>
-                        <a:rPr sz="1000"/>
-                        <a:t>Azrul bin Osman Rani (G12, CT)</a:t>
-                      </a:r>
-                    </a:p>
-                    <a:p>
-                      <a:r>
-                        <a:rPr sz="1000"/>
-                        <a:t>Managing Director/CEO, MD/CEO Office, Marketing, PDB, Downstream Business</a:t>
-                      </a:r>
-                    </a:p>
-                    <a:p>
-                      <a:r>
-                        <a:rPr sz="1000"/>
-                        <a:t>Retire: 13/11/2033,   Age: 46</a:t>
-                      </a:r>
-                    </a:p>
-                    <a:p>
-                      <a:r>
-                        <a:rPr sz="1000"/>
-                        <a:t>PPA: 2, 1, 2, 1, 2</a:t>
-                      </a:r>
-                    </a:p>
-                  </a:txBody>
-                  <a:tcPr/>
-                </a:tc>
-                <a:tc>
-                  <a:txBody>
-                    <a:bodyPr/>
-                    <a:lstStyle/>
-                    <a:p/>
-                  </a:txBody>
-                  <a:tcPr/>
-                </a:tc>
-                <a:tc>
-                  <a:txBody>
-                    <a:bodyPr/>
-                    <a:lstStyle/>
-                    <a:p>
-                      <a:r>
-                        <a:rPr sz="1000"/>
-                        <a:t>Ezran bin Mahadzir (G11, CT)</a:t>
-                      </a:r>
-                    </a:p>
-                    <a:p>
-                      <a:r>
-                        <a:rPr sz="1000"/>
-                        <a:t>Head (Energy &amp; Gas Trading), Energy &amp; Gas Trading, Gas &amp; Power, PEGT, Gas &amp; New Energy</a:t>
-                      </a:r>
-                    </a:p>
-                    <a:p>
-                      <a:r>
-                        <a:rPr sz="1000"/>
-                        <a:t>Retire: 24/04/2030,   Age: 44</a:t>
-                      </a:r>
-                    </a:p>
-                    <a:p>
-                      <a:r>
-                        <a:rPr sz="1000"/>
-                        <a:t>PPA: 1, 1, 2, 2, 2</a:t>
-                      </a:r>
-                    </a:p>
-                  </a:txBody>
-                  <a:tcPr/>
-                </a:tc>
-                <a:tc>
-                  <a:txBody>
-                    <a:bodyPr/>
-                    <a:lstStyle/>
-                    <a:p/>
-                  </a:txBody>
-                  <a:tcPr/>
-                </a:tc>
-                <a:tc>
-                  <a:txBody>
-                    <a:bodyPr/>
-                    <a:lstStyle/>
-                    <a:p>
-                      <a:r>
-                        <a:rPr sz="1000"/>
-                        <a:t>Abdullah Ayman bin Awaluddin (G08, CT)</a:t>
-                      </a:r>
-                    </a:p>
-                    <a:p>
-                      <a:r>
-                        <a:rPr sz="1000"/>
-                        <a:t>Head (Venture Architect), Venture Architect, Venture Builder, Marketing, PDB, Downstream Business</a:t>
-                      </a:r>
-                    </a:p>
-                    <a:p>
-                      <a:r>
-                        <a:rPr sz="1000"/>
-                        <a:t>Retire: 30/07/2041,   Age: 38</a:t>
-                      </a:r>
-                    </a:p>
-                    <a:p>
-                      <a:r>
-                        <a:rPr sz="1000"/>
-                        <a:t>PPA: 3H, 2, 1, 1, 3H</a:t>
-                      </a:r>
-                    </a:p>
-                  </a:txBody>
-                  <a:tcPr/>
-                </a:tc>
-              </a:tr>
-              <a:tr h="182880">
-                <a:tc>
-                  <a:txBody>
-                    <a:bodyPr/>
-                    <a:lstStyle/>
-                    <a:p/>
-                  </a:txBody>
-                  <a:tcPr/>
-                </a:tc>
-                <a:tc>
-                  <a:txBody>
-                    <a:bodyPr/>
-                    <a:lstStyle/>
-                    <a:p/>
-                  </a:txBody>
-                  <a:tcPr/>
-                </a:tc>
-                <a:tc>
-                  <a:txBody>
-                    <a:bodyPr/>
-                    <a:lstStyle/>
-                    <a:p/>
-                  </a:txBody>
-                  <a:tcPr/>
-                </a:tc>
-                <a:tc>
-                  <a:txBody>
-                    <a:bodyPr/>
-                    <a:lstStyle/>
-                    <a:p>
-                      <a:r>
-                        <a:rPr sz="1000"/>
-                        <a:t>Mazlin Erawati binti Ab Manan (G10, CT)</a:t>
-                      </a:r>
-                    </a:p>
-                    <a:p>
-                      <a:r>
-                        <a:rPr sz="1000"/>
-                        <a:t>Head (CEO Office), RC &amp; Petrochemical, Project, PRPC, Downstream Business</a:t>
-                      </a:r>
-                    </a:p>
-                    <a:p>
-                      <a:r>
-                        <a:rPr sz="1000"/>
-                        <a:t>Retire: 17/01/2040,   Age: 40</a:t>
-                      </a:r>
-                    </a:p>
-                    <a:p>
-                      <a:r>
-                        <a:rPr sz="1000"/>
-                        <a:t>PPA: 2, 2, 2, 2, 1</a:t>
-                      </a:r>
-                    </a:p>
-                  </a:txBody>
-                  <a:tcPr/>
-                </a:tc>
-                <a:tc>
-                  <a:txBody>
-                    <a:bodyPr/>
-                    <a:lstStyle/>
-                    <a:p/>
-                  </a:txBody>
-                  <a:tcPr/>
-                </a:tc>
-                <a:tc>
-                  <a:txBody>
-                    <a:bodyPr/>
-                    <a:lstStyle/>
-                    <a:p>
-                      <a:r>
-                        <a:rPr sz="1000"/>
-                        <a:t>Nazri Idzlan bin Abdul Malek (G08, CT)</a:t>
-                      </a:r>
-                    </a:p>
-                    <a:p>
-                      <a:r>
-                        <a:rPr sz="1000"/>
-                        <a:t>Head, Strategic Planning &amp; Buss Dev, Strategic Planning &amp; Buss Development, Refining &amp; Trading, Downstream Corporate Office, PETRONAS </a:t>
-                      </a:r>
-                    </a:p>
-                    <a:p>
-                      <a:r>
-                        <a:rPr sz="1000"/>
-                        <a:t>Retire: 21/12/2041,   Age: 38</a:t>
-                      </a:r>
-                    </a:p>
-                    <a:p>
-                      <a:r>
-                        <a:rPr sz="1000"/>
-                        <a:t>PPA: SDP, SDP, 3S, 3H, 2</a:t>
-                      </a:r>
-                    </a:p>
-                  </a:txBody>
-                  <a:tcPr/>
-                </a:tc>
-              </a:tr>
-            </a:tbl>
-          </a:graphicData>
-        </a:graphic>
-      </p:graphicFrame>
     </p:spTree>
   </p:cSld>
   <p:clrMapOvr>
@@ -4416,531 +3316,6 @@
           </a:p>
         </p:txBody>
       </p:sp>
-      <p:graphicFrame>
-        <p:nvGraphicFramePr>
-          <p:cNvPr id="4" name="Table 3"/>
-          <p:cNvGraphicFramePr>
-            <a:graphicFrameLocks noGrp="1"/>
-          </p:cNvGraphicFramePr>
-          <p:nvPr/>
-        </p:nvGraphicFramePr>
-        <p:xfrm>
-          <a:off x="274320" y="1371600"/>
-          <a:ext cx="8778240" cy="731520"/>
-        </p:xfrm>
-        <a:graphic>
-          <a:graphicData uri="http://schemas.openxmlformats.org/drawingml/2006/table">
-            <a:tbl>
-              <a:tblPr firstRow="1" bandRow="1">
-                <a:tableStyleId>{5C22544A-7EE6-4342-B048-85BDC9FD1C3A}</a:tableStyleId>
-              </a:tblPr>
-              <a:tblGrid>
-                <a:gridCol w="914400"/>
-                <a:gridCol w="2011680"/>
-                <a:gridCol w="914400"/>
-                <a:gridCol w="2011680"/>
-                <a:gridCol w="914400"/>
-                <a:gridCol w="2011680"/>
-              </a:tblGrid>
-              <a:tr h="146304">
-                <a:tc>
-                  <a:txBody>
-                    <a:bodyPr/>
-                    <a:lstStyle/>
-                    <a:p/>
-                  </a:txBody>
-                  <a:tcPr/>
-                </a:tc>
-                <a:tc>
-                  <a:txBody>
-                    <a:bodyPr/>
-                    <a:lstStyle/>
-                    <a:p>
-                      <a:r>
-                        <a:rPr sz="1000"/>
-                        <a:t>1st Line</a:t>
-                      </a:r>
-                    </a:p>
-                  </a:txBody>
-                  <a:tcPr/>
-                </a:tc>
-                <a:tc>
-                  <a:txBody>
-                    <a:bodyPr/>
-                    <a:lstStyle/>
-                    <a:p/>
-                  </a:txBody>
-                  <a:tcPr/>
-                </a:tc>
-                <a:tc>
-                  <a:txBody>
-                    <a:bodyPr/>
-                    <a:lstStyle/>
-                    <a:p>
-                      <a:r>
-                        <a:rPr sz="1000"/>
-                        <a:t>2nd Line</a:t>
-                      </a:r>
-                    </a:p>
-                  </a:txBody>
-                  <a:tcPr/>
-                </a:tc>
-                <a:tc>
-                  <a:txBody>
-                    <a:bodyPr/>
-                    <a:lstStyle/>
-                    <a:p/>
-                  </a:txBody>
-                  <a:tcPr/>
-                </a:tc>
-                <a:tc>
-                  <a:txBody>
-                    <a:bodyPr/>
-                    <a:lstStyle/>
-                    <a:p>
-                      <a:r>
-                        <a:rPr sz="1000"/>
-                        <a:t>3rd Line</a:t>
-                      </a:r>
-                    </a:p>
-                  </a:txBody>
-                  <a:tcPr/>
-                </a:tc>
-              </a:tr>
-              <a:tr h="146304">
-                <a:tc>
-                  <a:txBody>
-                    <a:bodyPr/>
-                    <a:lstStyle/>
-                    <a:p/>
-                  </a:txBody>
-                  <a:tcPr/>
-                </a:tc>
-                <a:tc>
-                  <a:txBody>
-                    <a:bodyPr/>
-                    <a:lstStyle/>
-                    <a:p>
-                      <a:r>
-                        <a:rPr sz="1000"/>
-                        <a:t>Azrul bin Osman Rani (G12, CT)</a:t>
-                      </a:r>
-                    </a:p>
-                    <a:p>
-                      <a:r>
-                        <a:rPr sz="1000"/>
-                        <a:t>Managing Director/CEO, MD/CEO Office, Marketing, PDB, Downstream Business</a:t>
-                      </a:r>
-                    </a:p>
-                    <a:p>
-                      <a:r>
-                        <a:rPr sz="1000"/>
-                        <a:t>Retire: 13/11/2033,   Age: 46</a:t>
-                      </a:r>
-                    </a:p>
-                    <a:p>
-                      <a:r>
-                        <a:rPr sz="1000"/>
-                        <a:t>PPA: 2, 1, 2, 1, 2</a:t>
-                      </a:r>
-                    </a:p>
-                  </a:txBody>
-                  <a:tcPr/>
-                </a:tc>
-                <a:tc>
-                  <a:txBody>
-                    <a:bodyPr/>
-                    <a:lstStyle/>
-                    <a:p/>
-                  </a:txBody>
-                  <a:tcPr/>
-                </a:tc>
-                <a:tc>
-                  <a:txBody>
-                    <a:bodyPr/>
-                    <a:lstStyle/>
-                    <a:p>
-                      <a:r>
-                        <a:rPr sz="1000"/>
-                        <a:t>Norliana Aida binti Ramli (G09, CT)</a:t>
-                      </a:r>
-                    </a:p>
-                    <a:p>
-                      <a:r>
-                        <a:rPr sz="1000"/>
-                        <a:t>Head (Project Development), Project Development, Strategic Planning &amp; Ventures Department, PCGB, Downstream Business</a:t>
-                      </a:r>
-                    </a:p>
-                    <a:p>
-                      <a:r>
-                        <a:rPr sz="1000"/>
-                        <a:t>Retire: 17/08/2036,   Age: 43</a:t>
-                      </a:r>
-                    </a:p>
-                    <a:p>
-                      <a:r>
-                        <a:rPr sz="1000"/>
-                        <a:t>PPA: 2, 2, 2, 1, 2</a:t>
-                      </a:r>
-                    </a:p>
-                  </a:txBody>
-                  <a:tcPr/>
-                </a:tc>
-                <a:tc>
-                  <a:txBody>
-                    <a:bodyPr/>
-                    <a:lstStyle/>
-                    <a:p/>
-                  </a:txBody>
-                  <a:tcPr/>
-                </a:tc>
-                <a:tc>
-                  <a:txBody>
-                    <a:bodyPr/>
-                    <a:lstStyle/>
-                    <a:p>
-                      <a:r>
-                        <a:rPr sz="1000"/>
-                        <a:t>Muhammad Fahmi bin Ismail (G08, CT)</a:t>
-                      </a:r>
-                    </a:p>
-                    <a:p>
-                      <a:r>
-                        <a:rPr sz="1000"/>
-                        <a:t>Head (Project Development &amp; Formation), Project Development, Strategic Planning &amp; Ventures Department, PCGB, Downstream Business</a:t>
-                      </a:r>
-                    </a:p>
-                    <a:p>
-                      <a:r>
-                        <a:rPr sz="1000"/>
-                        <a:t>Retire: 27/12/2031,   Age: 43</a:t>
-                      </a:r>
-                    </a:p>
-                    <a:p>
-                      <a:r>
-                        <a:rPr sz="1000"/>
-                        <a:t>PPA: 2, 2, 2, 3H, 3S</a:t>
-                      </a:r>
-                    </a:p>
-                  </a:txBody>
-                  <a:tcPr/>
-                </a:tc>
-              </a:tr>
-              <a:tr h="146304">
-                <a:tc>
-                  <a:txBody>
-                    <a:bodyPr/>
-                    <a:lstStyle/>
-                    <a:p/>
-                  </a:txBody>
-                  <a:tcPr/>
-                </a:tc>
-                <a:tc>
-                  <a:txBody>
-                    <a:bodyPr/>
-                    <a:lstStyle/>
-                    <a:p>
-                      <a:r>
-                        <a:rPr sz="1000"/>
-                        <a:t>Ruslan Halim bin Islahudin (G10, CT)</a:t>
-                      </a:r>
-                    </a:p>
-                    <a:p>
-                      <a:r>
-                        <a:rPr sz="1000"/>
-                        <a:t>Head (Human Capital Strategy), Human Capital Strategy, Group Human Resource Management, PETRONAS </a:t>
-                      </a:r>
-                    </a:p>
-                    <a:p>
-                      <a:r>
-                        <a:rPr sz="1000"/>
-                        <a:t>Retire: 24/04/2030,   Age: 44</a:t>
-                      </a:r>
-                    </a:p>
-                    <a:p>
-                      <a:r>
-                        <a:rPr sz="1000"/>
-                        <a:t>PPA: 2, 1, 1, 1, 2</a:t>
-                      </a:r>
-                    </a:p>
-                  </a:txBody>
-                  <a:tcPr/>
-                </a:tc>
-                <a:tc>
-                  <a:txBody>
-                    <a:bodyPr/>
-                    <a:lstStyle/>
-                    <a:p/>
-                  </a:txBody>
-                  <a:tcPr/>
-                </a:tc>
-                <a:tc>
-                  <a:txBody>
-                    <a:bodyPr/>
-                    <a:lstStyle/>
-                    <a:p>
-                      <a:r>
-                        <a:rPr sz="1000"/>
-                        <a:t>Wan Sayuti bin Wan Hussin (G09, CT)</a:t>
-                      </a:r>
-                    </a:p>
-                    <a:p>
-                      <a:r>
-                        <a:rPr sz="1000"/>
-                        <a:t>Head (Project), Strategic Research, Corporate Strategy, PETRONAS </a:t>
-                      </a:r>
-                    </a:p>
-                    <a:p>
-                      <a:r>
-                        <a:rPr sz="1000"/>
-                        <a:t>Retire: 27/09/2039,   Age: 40</a:t>
-                      </a:r>
-                    </a:p>
-                    <a:p>
-                      <a:r>
-                        <a:rPr sz="1000"/>
-                        <a:t>PPA: 1, 2, 3H, UL, 2</a:t>
-                      </a:r>
-                    </a:p>
-                  </a:txBody>
-                  <a:tcPr/>
-                </a:tc>
-                <a:tc>
-                  <a:txBody>
-                    <a:bodyPr/>
-                    <a:lstStyle/>
-                    <a:p/>
-                  </a:txBody>
-                  <a:tcPr/>
-                </a:tc>
-                <a:tc>
-                  <a:txBody>
-                    <a:bodyPr/>
-                    <a:lstStyle/>
-                    <a:p>
-                      <a:r>
-                        <a:rPr sz="1000"/>
-                        <a:t>Shahrom Muhammad bin Yusuf (G09, CT)</a:t>
-                      </a:r>
-                    </a:p>
-                    <a:p>
-                      <a:r>
-                        <a:rPr sz="1000"/>
-                        <a:t>Head(Mktg &amp; Sls Methanol, Aro &amp; MTBE), Mktg &amp; Sls(Methanol,Aromatics &amp; MTBE), PCML, Downstream Business</a:t>
-                      </a:r>
-                    </a:p>
-                    <a:p>
-                      <a:r>
-                        <a:rPr sz="1000"/>
-                        <a:t>Retire: 02/08/2035,   Age: 44</a:t>
-                      </a:r>
-                    </a:p>
-                    <a:p>
-                      <a:r>
-                        <a:rPr sz="1000"/>
-                        <a:t>PPA: 2, 1, 2, 2, 2</a:t>
-                      </a:r>
-                    </a:p>
-                  </a:txBody>
-                  <a:tcPr/>
-                </a:tc>
-              </a:tr>
-              <a:tr h="146304">
-                <a:tc>
-                  <a:txBody>
-                    <a:bodyPr/>
-                    <a:lstStyle/>
-                    <a:p/>
-                  </a:txBody>
-                  <a:tcPr/>
-                </a:tc>
-                <a:tc>
-                  <a:txBody>
-                    <a:bodyPr/>
-                    <a:lstStyle/>
-                    <a:p>
-                      <a:r>
-                        <a:rPr sz="1000"/>
-                        <a:t>Lim Li Ping (G10, CT)</a:t>
-                      </a:r>
-                    </a:p>
-                    <a:p>
-                      <a:r>
-                        <a:rPr sz="1000"/>
-                        <a:t>Head (Commercial Malaysia), Commercial Malaysia, Commercial, Strategy &amp; Commercial, PCSB, Upstream Business</a:t>
-                      </a:r>
-                    </a:p>
-                    <a:p>
-                      <a:r>
-                        <a:rPr sz="1000"/>
-                        <a:t>Retire: 03/02/2034,   Age: 45</a:t>
-                      </a:r>
-                    </a:p>
-                    <a:p>
-                      <a:r>
-                        <a:rPr sz="1000"/>
-                        <a:t>PPA: 2, 2, 1, 2, SDP</a:t>
-                      </a:r>
-                    </a:p>
-                  </a:txBody>
-                  <a:tcPr/>
-                </a:tc>
-                <a:tc>
-                  <a:txBody>
-                    <a:bodyPr/>
-                    <a:lstStyle/>
-                    <a:p/>
-                  </a:txBody>
-                  <a:tcPr/>
-                </a:tc>
-                <a:tc>
-                  <a:txBody>
-                    <a:bodyPr/>
-                    <a:lstStyle/>
-                    <a:p>
-                      <a:r>
-                        <a:rPr sz="1000"/>
-                        <a:t>Yaacob bin Salim (G10, CT)</a:t>
-                      </a:r>
-                    </a:p>
-                    <a:p>
-                      <a:r>
-                        <a:rPr sz="1000"/>
-                        <a:t>Deputy Project Director (Petchem), Deputy Project (Petchem), Petchem, Project, PRPC, Downstream Business</a:t>
-                      </a:r>
-                    </a:p>
-                    <a:p>
-                      <a:r>
-                        <a:rPr sz="1000"/>
-                        <a:t>Retire: 03/02/2027,   Age: 52</a:t>
-                      </a:r>
-                    </a:p>
-                    <a:p>
-                      <a:r>
-                        <a:rPr sz="1000"/>
-                        <a:t>PPA: 1, 2, 2, 2, 2</a:t>
-                      </a:r>
-                    </a:p>
-                  </a:txBody>
-                  <a:tcPr/>
-                </a:tc>
-                <a:tc>
-                  <a:txBody>
-                    <a:bodyPr/>
-                    <a:lstStyle/>
-                    <a:p/>
-                  </a:txBody>
-                  <a:tcPr/>
-                </a:tc>
-                <a:tc>
-                  <a:txBody>
-                    <a:bodyPr/>
-                    <a:lstStyle/>
-                    <a:p>
-                      <a:r>
-                        <a:rPr sz="1000"/>
-                        <a:t>Bahrin bin Asmawi (G09, CT)</a:t>
-                      </a:r>
-                    </a:p>
-                    <a:p>
-                      <a:r>
-                        <a:rPr sz="1000"/>
-                        <a:t>Head (EVP &amp; CEO Downstream Office), EVP &amp; CEO Downstream Office, Downstream Corporate Office, PETRONAS </a:t>
-                      </a:r>
-                    </a:p>
-                    <a:p>
-                      <a:r>
-                        <a:rPr sz="1000"/>
-                        <a:t>Retire: 14/10/2028,   Age: 46</a:t>
-                      </a:r>
-                    </a:p>
-                    <a:p>
-                      <a:r>
-                        <a:rPr sz="1000"/>
-                        <a:t>PPA: 2, 2, 2, 2, 2</a:t>
-                      </a:r>
-                    </a:p>
-                  </a:txBody>
-                  <a:tcPr/>
-                </a:tc>
-              </a:tr>
-              <a:tr h="146304">
-                <a:tc>
-                  <a:txBody>
-                    <a:bodyPr/>
-                    <a:lstStyle/>
-                    <a:p/>
-                  </a:txBody>
-                  <a:tcPr/>
-                </a:tc>
-                <a:tc>
-                  <a:txBody>
-                    <a:bodyPr/>
-                    <a:lstStyle/>
-                    <a:p/>
-                  </a:txBody>
-                  <a:tcPr/>
-                </a:tc>
-                <a:tc>
-                  <a:txBody>
-                    <a:bodyPr/>
-                    <a:lstStyle/>
-                    <a:p/>
-                  </a:txBody>
-                  <a:tcPr/>
-                </a:tc>
-                <a:tc>
-                  <a:txBody>
-                    <a:bodyPr/>
-                    <a:lstStyle/>
-                    <a:p/>
-                  </a:txBody>
-                  <a:tcPr/>
-                </a:tc>
-                <a:tc>
-                  <a:txBody>
-                    <a:bodyPr/>
-                    <a:lstStyle/>
-                    <a:p/>
-                  </a:txBody>
-                  <a:tcPr/>
-                </a:tc>
-                <a:tc>
-                  <a:txBody>
-                    <a:bodyPr/>
-                    <a:lstStyle/>
-                    <a:p>
-                      <a:r>
-                        <a:rPr sz="1000"/>
-                        <a:t>Vimal Rao A/L Veerasamy (G05, )</a:t>
-                      </a:r>
-                    </a:p>
-                    <a:p>
-                      <a:r>
-                        <a:rPr sz="1000"/>
-                        <a:t>Head (Communications International), Communications Planning, Communications Management, Group Strategic Communications, PETRONAS </a:t>
-                      </a:r>
-                    </a:p>
-                    <a:p>
-                      <a:r>
-                        <a:rPr sz="1000"/>
-                        <a:t>Retire: 15/05/2041,   Age: 38</a:t>
-                      </a:r>
-                    </a:p>
-                    <a:p>
-                      <a:r>
-                        <a:rPr sz="1000"/>
-                        <a:t>PPA: 3H, 3H, 2, 1, 3H</a:t>
-                      </a:r>
-                    </a:p>
-                  </a:txBody>
-                  <a:tcPr/>
-                </a:tc>
-              </a:tr>
-            </a:tbl>
-          </a:graphicData>
-        </a:graphic>
-      </p:graphicFrame>
     </p:spTree>
   </p:cSld>
   <p:clrMapOvr>

</xml_diff>